<commit_message>
Fixed code errors on three slides
Word "new" included with table and row creation was removed as it's not correct to have it there.
</commit_message>
<xml_diff>
--- a/320.pptx
+++ b/320.pptx
@@ -251,7 +251,7 @@
               <a:pPr>
                 <a:defRPr/>
               </a:pPr>
-              <a:t>12/14/11</a:t>
+              <a:t>1/5/12</a:t>
             </a:fld>
             <a:endParaRPr lang="en-US"/>
           </a:p>
@@ -434,7 +434,7 @@
               <a:pPr>
                 <a:defRPr/>
               </a:pPr>
-              <a:t>12/14/11</a:t>
+              <a:t>1/5/12</a:t>
             </a:fld>
             <a:endParaRPr lang="en-US"/>
           </a:p>
@@ -1596,33 +1596,13 @@
           <a:p>
             <a:r>
               <a:rPr lang="en-US" baseline="0" dirty="0" smtClean="0"/>
-              <a:t>Titanium 1.8 </a:t>
-            </a:r>
+              <a:t>Titanium 1.8 adds support for native long-press event,</a:t>
+            </a:r>
+          </a:p>
+          <a:p>
             <a:r>
               <a:rPr lang="en-US" baseline="0" dirty="0" smtClean="0"/>
-              <a:t>adds support for native </a:t>
-            </a:r>
-            <a:r>
-              <a:rPr lang="en-US" baseline="0" dirty="0" smtClean="0"/>
-              <a:t>long-</a:t>
-            </a:r>
-            <a:r>
-              <a:rPr lang="en-US" baseline="0" dirty="0" smtClean="0"/>
-              <a:t>press event,</a:t>
-            </a:r>
-          </a:p>
-          <a:p>
-            <a:r>
-              <a:rPr lang="en-US" baseline="0" dirty="0" smtClean="0"/>
-              <a:t>gist </a:t>
-            </a:r>
-            <a:r>
-              <a:rPr lang="en-US" baseline="0" dirty="0" smtClean="0"/>
-              <a:t>workaround </a:t>
-            </a:r>
-            <a:r>
-              <a:rPr lang="en-US" baseline="0" dirty="0" smtClean="0"/>
-              <a:t>useful for older SDKs</a:t>
+              <a:t>gist workaround useful for older SDKs</a:t>
             </a:r>
             <a:endParaRPr lang="en-US" dirty="0"/>
           </a:p>
@@ -3433,11 +3413,7 @@
             </a:r>
             <a:r>
               <a:rPr lang="en-US" baseline="0" dirty="0" smtClean="0"/>
-              <a:t> </a:t>
-            </a:r>
-            <a:r>
-              <a:rPr lang="en-US" baseline="0" dirty="0" smtClean="0"/>
-              <a:t>when you want to manipulate the row’s properties before/after adding to the table</a:t>
+              <a:t> when you want to manipulate the row’s properties before/after adding to the table</a:t>
             </a:r>
           </a:p>
           <a:p>
@@ -4095,7 +4071,7 @@
               <a:pPr>
                 <a:defRPr/>
               </a:pPr>
-              <a:t>12/14/11</a:t>
+              <a:t>1/5/12</a:t>
             </a:fld>
             <a:endParaRPr lang="en-US"/>
           </a:p>
@@ -4475,7 +4451,7 @@
               <a:pPr>
                 <a:defRPr/>
               </a:pPr>
-              <a:t>12/14/11</a:t>
+              <a:t>1/5/12</a:t>
             </a:fld>
             <a:endParaRPr lang="en-US"/>
           </a:p>
@@ -5037,7 +5013,7 @@
               <a:pPr>
                 <a:defRPr/>
               </a:pPr>
-              <a:t>12/14/11</a:t>
+              <a:t>1/5/12</a:t>
             </a:fld>
             <a:endParaRPr lang="en-US"/>
           </a:p>
@@ -5647,7 +5623,7 @@
               <a:pPr>
                 <a:defRPr/>
               </a:pPr>
-              <a:t>12/14/11</a:t>
+              <a:t>1/5/12</a:t>
             </a:fld>
             <a:endParaRPr lang="en-US"/>
           </a:p>
@@ -5769,7 +5745,7 @@
               <a:pPr>
                 <a:defRPr/>
               </a:pPr>
-              <a:t>12/14/11</a:t>
+              <a:t>1/5/12</a:t>
             </a:fld>
             <a:endParaRPr lang="en-US"/>
           </a:p>
@@ -6056,7 +6032,7 @@
               <a:pPr>
                 <a:defRPr/>
               </a:pPr>
-              <a:t>12/14/11</a:t>
+              <a:t>1/5/12</a:t>
             </a:fld>
             <a:endParaRPr lang="en-US"/>
           </a:p>
@@ -13067,7 +13043,6 @@
               <a:rPr lang="en-US" sz="2000" dirty="0" smtClean="0"/>
               <a:t> (1.8+)</a:t>
             </a:r>
-            <a:endParaRPr lang="en-US" sz="2000" dirty="0" smtClean="0"/>
           </a:p>
           <a:p>
             <a:pPr marL="342900" indent="-342900">
@@ -16480,10 +16455,10 @@
               <a:rPr lang="en-US" sz="2000" dirty="0">
                 <a:latin typeface="Monaco" charset="0"/>
               </a:rPr>
-              <a:t> table = new </a:t>
-            </a:r>
-            <a:r>
-              <a:rPr lang="en-US" sz="2000" dirty="0" err="1">
+              <a:t> table = </a:t>
+            </a:r>
+            <a:r>
+              <a:rPr lang="en-US" sz="2000" dirty="0" err="1" smtClean="0">
                 <a:latin typeface="Monaco" charset="0"/>
               </a:rPr>
               <a:t>Titanium.UI.createTableView</a:t>
@@ -17014,10 +16989,10 @@
                 <a:latin typeface="Courier"/>
                 <a:cs typeface="Courier"/>
               </a:rPr>
-              <a:t>table = new </a:t>
-            </a:r>
-            <a:r>
-              <a:rPr lang="en-US" sz="2000" dirty="0" err="1">
+              <a:t>table = </a:t>
+            </a:r>
+            <a:r>
+              <a:rPr lang="en-US" sz="2000" dirty="0" err="1" smtClean="0">
                 <a:latin typeface="Courier"/>
                 <a:cs typeface="Courier"/>
               </a:rPr>
@@ -17404,10 +17379,10 @@
               <a:rPr lang="en-US" sz="2000" dirty="0">
                 <a:latin typeface="Monaco" charset="0"/>
               </a:rPr>
-              <a:t> row = new </a:t>
-            </a:r>
-            <a:r>
-              <a:rPr lang="en-US" sz="2000" dirty="0" err="1">
+              <a:t> row = </a:t>
+            </a:r>
+            <a:r>
+              <a:rPr lang="en-US" sz="2000" dirty="0" err="1" smtClean="0">
                 <a:latin typeface="Monaco" charset="0"/>
               </a:rPr>
               <a:t>Titanium.UI.createTableViewRow</a:t>

</xml_diff>